<commit_message>
MAJ-882 update architecture images
</commit_message>
<xml_diff>
--- a/devuserguide/en-GB/images/architecture slides.pptx
+++ b/devuserguide/en-GB/images/architecture slides.pptx
@@ -8729,8 +8729,21 @@
                   <a:schemeClr val="tx1"/>
                 </a:solidFill>
               </a:rPr>
-              <a:t>GWT face server</a:t>
-            </a:r>
+              <a:t>GWT face </a:t>
+            </a:r>
+            <a:r>
+              <a:rPr lang="nl-BE" dirty="0" smtClean="0">
+                <a:solidFill>
+                  <a:schemeClr val="tx1"/>
+                </a:solidFill>
+              </a:rPr>
+              <a:t>server</a:t>
+            </a:r>
+            <a:endParaRPr lang="nl-BE" dirty="0">
+              <a:solidFill>
+                <a:schemeClr val="tx1"/>
+              </a:solidFill>
+            </a:endParaRPr>
           </a:p>
         </p:txBody>
       </p:sp>
@@ -8927,12 +8940,12 @@
               <a:t> </a:t>
             </a:r>
             <a:r>
-              <a:rPr lang="nl-BE" dirty="0" err="1">
+              <a:rPr lang="nl-BE" dirty="0" smtClean="0">
                 <a:solidFill>
                   <a:schemeClr val="tx1"/>
                 </a:solidFill>
               </a:rPr>
-              <a:t>extension</a:t>
+              <a:t>plug-in</a:t>
             </a:r>
             <a:endParaRPr lang="nl-BE" dirty="0">
               <a:solidFill>
@@ -8999,21 +9012,18 @@
               <a:t> </a:t>
             </a:r>
             <a:r>
-              <a:rPr lang="nl-BE" dirty="0" err="1">
+              <a:rPr lang="nl-BE" dirty="0" err="1" smtClean="0">
                 <a:solidFill>
                   <a:schemeClr val="tx1"/>
                 </a:solidFill>
               </a:rPr>
               <a:t>layer</a:t>
             </a:r>
-            <a:r>
-              <a:rPr lang="nl-BE" dirty="0">
-                <a:solidFill>
-                  <a:schemeClr val="tx1"/>
-                </a:solidFill>
-              </a:rPr>
-              <a:t> model</a:t>
-            </a:r>
+            <a:endParaRPr lang="nl-BE" dirty="0">
+              <a:solidFill>
+                <a:schemeClr val="tx1"/>
+              </a:solidFill>
+            </a:endParaRPr>
           </a:p>
         </p:txBody>
       </p:sp>
@@ -10229,7 +10239,15 @@
                   <a:schemeClr val="tx1"/>
                 </a:solidFill>
               </a:rPr>
-              <a:t>face </a:t>
+              <a:t>F</a:t>
+            </a:r>
+            <a:r>
+              <a:rPr lang="nl-BE" dirty="0" smtClean="0">
+                <a:solidFill>
+                  <a:schemeClr val="tx1"/>
+                </a:solidFill>
+              </a:rPr>
+              <a:t>ace </a:t>
             </a:r>
             <a:r>
               <a:rPr lang="nl-BE" dirty="0" err="1">
@@ -11164,7 +11182,7 @@
                 <a:effectLst/>
                 <a:latin typeface="Arial" charset="0"/>
               </a:rPr>
-              <a:t>ommandRequest</a:t>
+              <a:t>ommandResponse</a:t>
             </a:r>
             <a:endParaRPr kumimoji="0" lang="nl-BE" sz="1200" b="0" i="0" u="none" strike="noStrike" cap="none" normalizeH="0" baseline="0" dirty="0" smtClean="0">
               <a:ln>
@@ -11417,7 +11435,7 @@
                   <a:schemeClr val="tx1"/>
                 </a:solidFill>
               </a:rPr>
-              <a:t>GeoSecurityManager</a:t>
+              <a:t>SecurityManager</a:t>
             </a:r>
             <a:endParaRPr lang="nl-BE" dirty="0">
               <a:solidFill>
@@ -12417,8 +12435,8 @@
         </p:nvSpPr>
         <p:spPr bwMode="auto">
           <a:xfrm>
-            <a:off x="1571604" y="1071546"/>
-            <a:ext cx="6215106" cy="5214974"/>
+            <a:off x="1571604" y="1500174"/>
+            <a:ext cx="6215106" cy="3857652"/>
           </a:xfrm>
           <a:prstGeom prst="roundRect">
             <a:avLst/>
@@ -12466,8 +12484,8 @@
         </p:nvSpPr>
         <p:spPr bwMode="auto">
           <a:xfrm>
-            <a:off x="2071694" y="1785939"/>
-            <a:ext cx="3286125" cy="2500312"/>
+            <a:off x="2071694" y="2214566"/>
+            <a:ext cx="3286125" cy="2571755"/>
           </a:xfrm>
           <a:prstGeom prst="roundRect">
             <a:avLst/>
@@ -12556,7 +12574,7 @@
         </p:nvSpPr>
         <p:spPr bwMode="auto">
           <a:xfrm>
-            <a:off x="2143107" y="1214422"/>
+            <a:off x="2143107" y="1643050"/>
             <a:ext cx="2172390" cy="369332"/>
           </a:xfrm>
           <a:prstGeom prst="rect">
@@ -12608,7 +12626,7 @@
         </p:nvSpPr>
         <p:spPr bwMode="auto">
           <a:xfrm>
-            <a:off x="2357444" y="2357439"/>
+            <a:off x="2357444" y="2786067"/>
             <a:ext cx="2643188" cy="1571625"/>
           </a:xfrm>
           <a:prstGeom prst="roundRect">
@@ -12658,13 +12676,54 @@
       </p:sp>
       <p:sp>
         <p:nvSpPr>
-          <p:cNvPr id="37" name="Afgeronde rechthoek 36"/>
+          <p:cNvPr id="8200" name="Tekstvak 48"/>
+          <p:cNvSpPr txBox="1">
+            <a:spLocks noChangeArrowheads="1"/>
+          </p:cNvSpPr>
+          <p:nvPr/>
+        </p:nvSpPr>
+        <p:spPr bwMode="auto">
+          <a:xfrm>
+            <a:off x="2286007" y="2286004"/>
+            <a:ext cx="1620837" cy="369888"/>
+          </a:xfrm>
+          <a:prstGeom prst="rect">
+            <a:avLst/>
+          </a:prstGeom>
+          <a:noFill/>
+          <a:ln w="9525">
+            <a:noFill/>
+            <a:miter lim="800000"/>
+            <a:headEnd/>
+            <a:tailEnd/>
+          </a:ln>
+        </p:spPr>
+        <p:txBody>
+          <a:bodyPr wrap="none">
+            <a:spAutoFit/>
+          </a:bodyPr>
+          <a:lstStyle/>
+          <a:p>
+            <a:r>
+              <a:rPr lang="nl-BE">
+                <a:solidFill>
+                  <a:schemeClr val="tx1"/>
+                </a:solidFill>
+              </a:rPr>
+              <a:t>Geomajas-api</a:t>
+            </a:r>
+          </a:p>
+        </p:txBody>
+      </p:sp>
+      <p:sp>
+        <p:nvSpPr>
+          <p:cNvPr id="52" name="Afgeronde rechthoek 51"/>
           <p:cNvSpPr/>
           <p:nvPr/>
         </p:nvSpPr>
         <p:spPr bwMode="auto">
           <a:xfrm>
-            <a:off x="3929069" y="4643439"/>
+            <a:off x="5857882" y="2214567"/>
             <a:ext cx="1428750" cy="1143000"/>
           </a:xfrm>
           <a:prstGeom prst="roundRect">
@@ -12702,16 +12761,13 @@
                   <a:schemeClr val="tx1"/>
                 </a:solidFill>
               </a:rPr>
-              <a:t>layer</a:t>
-            </a:r>
-            <a:r>
-              <a:rPr lang="nl-BE" dirty="0" smtClean="0">
-                <a:solidFill>
-                  <a:schemeClr val="tx1"/>
-                </a:solidFill>
-              </a:rPr>
-              <a:t> model</a:t>
-            </a:r>
+              <a:t>command</a:t>
+            </a:r>
+            <a:endParaRPr lang="nl-BE" dirty="0" smtClean="0">
+              <a:solidFill>
+                <a:schemeClr val="tx1"/>
+              </a:solidFill>
+            </a:endParaRPr>
           </a:p>
           <a:p>
             <a:pPr>
@@ -12735,54 +12791,13 @@
       </p:sp>
       <p:sp>
         <p:nvSpPr>
-          <p:cNvPr id="8200" name="Tekstvak 48"/>
-          <p:cNvSpPr txBox="1">
-            <a:spLocks noChangeArrowheads="1"/>
-          </p:cNvSpPr>
-          <p:nvPr/>
-        </p:nvSpPr>
-        <p:spPr bwMode="auto">
-          <a:xfrm>
-            <a:off x="2286007" y="1857376"/>
-            <a:ext cx="1620837" cy="369888"/>
-          </a:xfrm>
-          <a:prstGeom prst="rect">
-            <a:avLst/>
-          </a:prstGeom>
-          <a:noFill/>
-          <a:ln w="9525">
-            <a:noFill/>
-            <a:miter lim="800000"/>
-            <a:headEnd/>
-            <a:tailEnd/>
-          </a:ln>
-        </p:spPr>
-        <p:txBody>
-          <a:bodyPr wrap="none">
-            <a:spAutoFit/>
-          </a:bodyPr>
-          <a:lstStyle/>
-          <a:p>
-            <a:r>
-              <a:rPr lang="nl-BE">
-                <a:solidFill>
-                  <a:schemeClr val="tx1"/>
-                </a:solidFill>
-              </a:rPr>
-              <a:t>Geomajas-api</a:t>
-            </a:r>
-          </a:p>
-        </p:txBody>
-      </p:sp>
-      <p:sp>
-        <p:nvSpPr>
-          <p:cNvPr id="50" name="Afgeronde rechthoek 49"/>
+          <p:cNvPr id="55" name="Afgeronde rechthoek 54"/>
           <p:cNvSpPr/>
           <p:nvPr/>
         </p:nvSpPr>
         <p:spPr bwMode="auto">
           <a:xfrm>
-            <a:off x="2000257" y="4643439"/>
+            <a:off x="5857882" y="3643317"/>
             <a:ext cx="1428750" cy="1143000"/>
           </a:xfrm>
           <a:prstGeom prst="roundRect">
@@ -12820,7 +12835,15 @@
                   <a:schemeClr val="tx1"/>
                 </a:solidFill>
               </a:rPr>
-              <a:t>security</a:t>
+              <a:t>c</a:t>
+            </a:r>
+            <a:r>
+              <a:rPr lang="nl-BE" dirty="0" err="1" smtClean="0">
+                <a:solidFill>
+                  <a:schemeClr val="tx1"/>
+                </a:solidFill>
+              </a:rPr>
+              <a:t>ommon-servlet</a:t>
             </a:r>
             <a:endParaRPr lang="nl-BE" dirty="0" smtClean="0">
               <a:solidFill>
@@ -12839,254 +12862,6 @@
                 </a:solidFill>
               </a:rPr>
               <a:t>…</a:t>
-            </a:r>
-            <a:endParaRPr lang="nl-BE" dirty="0">
-              <a:solidFill>
-                <a:schemeClr val="tx1"/>
-              </a:solidFill>
-            </a:endParaRPr>
-          </a:p>
-        </p:txBody>
-      </p:sp>
-      <p:sp>
-        <p:nvSpPr>
-          <p:cNvPr id="52" name="Afgeronde rechthoek 51"/>
-          <p:cNvSpPr/>
-          <p:nvPr/>
-        </p:nvSpPr>
-        <p:spPr bwMode="auto">
-          <a:xfrm>
-            <a:off x="5857882" y="1785939"/>
-            <a:ext cx="1428750" cy="1143000"/>
-          </a:xfrm>
-          <a:prstGeom prst="roundRect">
-            <a:avLst/>
-          </a:prstGeom>
-          <a:ln>
-            <a:headEnd type="none" w="med" len="med"/>
-            <a:tailEnd type="none" w="med" len="med"/>
-          </a:ln>
-        </p:spPr>
-        <p:style>
-          <a:lnRef idx="1">
-            <a:schemeClr val="accent2"/>
-          </a:lnRef>
-          <a:fillRef idx="2">
-            <a:schemeClr val="accent2"/>
-          </a:fillRef>
-          <a:effectRef idx="1">
-            <a:schemeClr val="accent2"/>
-          </a:effectRef>
-          <a:fontRef idx="minor">
-            <a:schemeClr val="dk1"/>
-          </a:fontRef>
-        </p:style>
-        <p:txBody>
-          <a:bodyPr/>
-          <a:lstStyle/>
-          <a:p>
-            <a:pPr>
-              <a:defRPr/>
-            </a:pPr>
-            <a:r>
-              <a:rPr lang="nl-BE" dirty="0" err="1" smtClean="0">
-                <a:solidFill>
-                  <a:schemeClr val="tx1"/>
-                </a:solidFill>
-              </a:rPr>
-              <a:t>command</a:t>
-            </a:r>
-            <a:endParaRPr lang="nl-BE" dirty="0" smtClean="0">
-              <a:solidFill>
-                <a:schemeClr val="tx1"/>
-              </a:solidFill>
-            </a:endParaRPr>
-          </a:p>
-          <a:p>
-            <a:pPr>
-              <a:defRPr/>
-            </a:pPr>
-            <a:r>
-              <a:rPr lang="nl-BE" dirty="0" smtClean="0">
-                <a:solidFill>
-                  <a:schemeClr val="tx1"/>
-                </a:solidFill>
-              </a:rPr>
-              <a:t>…</a:t>
-            </a:r>
-            <a:endParaRPr lang="nl-BE" dirty="0">
-              <a:solidFill>
-                <a:schemeClr val="tx1"/>
-              </a:solidFill>
-            </a:endParaRPr>
-          </a:p>
-        </p:txBody>
-      </p:sp>
-      <p:sp>
-        <p:nvSpPr>
-          <p:cNvPr id="55" name="Afgeronde rechthoek 54"/>
-          <p:cNvSpPr/>
-          <p:nvPr/>
-        </p:nvSpPr>
-        <p:spPr bwMode="auto">
-          <a:xfrm>
-            <a:off x="5857882" y="3214689"/>
-            <a:ext cx="1428750" cy="1143000"/>
-          </a:xfrm>
-          <a:prstGeom prst="roundRect">
-            <a:avLst/>
-          </a:prstGeom>
-          <a:ln>
-            <a:headEnd type="none" w="med" len="med"/>
-            <a:tailEnd type="none" w="med" len="med"/>
-          </a:ln>
-        </p:spPr>
-        <p:style>
-          <a:lnRef idx="1">
-            <a:schemeClr val="accent2"/>
-          </a:lnRef>
-          <a:fillRef idx="2">
-            <a:schemeClr val="accent2"/>
-          </a:fillRef>
-          <a:effectRef idx="1">
-            <a:schemeClr val="accent2"/>
-          </a:effectRef>
-          <a:fontRef idx="minor">
-            <a:schemeClr val="dk1"/>
-          </a:fontRef>
-        </p:style>
-        <p:txBody>
-          <a:bodyPr/>
-          <a:lstStyle/>
-          <a:p>
-            <a:pPr>
-              <a:defRPr/>
-            </a:pPr>
-            <a:r>
-              <a:rPr lang="nl-BE" dirty="0" err="1" smtClean="0">
-                <a:solidFill>
-                  <a:schemeClr val="tx1"/>
-                </a:solidFill>
-              </a:rPr>
-              <a:t>rendering</a:t>
-            </a:r>
-            <a:endParaRPr lang="nl-BE" dirty="0" smtClean="0">
-              <a:solidFill>
-                <a:schemeClr val="tx1"/>
-              </a:solidFill>
-            </a:endParaRPr>
-          </a:p>
-          <a:p>
-            <a:pPr>
-              <a:defRPr/>
-            </a:pPr>
-            <a:r>
-              <a:rPr lang="nl-BE" dirty="0" err="1" smtClean="0">
-                <a:solidFill>
-                  <a:schemeClr val="tx1"/>
-                </a:solidFill>
-              </a:rPr>
-              <a:t>strategy</a:t>
-            </a:r>
-            <a:endParaRPr lang="nl-BE" dirty="0" smtClean="0">
-              <a:solidFill>
-                <a:schemeClr val="tx1"/>
-              </a:solidFill>
-            </a:endParaRPr>
-          </a:p>
-          <a:p>
-            <a:pPr>
-              <a:defRPr/>
-            </a:pPr>
-            <a:r>
-              <a:rPr lang="nl-BE" dirty="0" smtClean="0">
-                <a:solidFill>
-                  <a:schemeClr val="tx1"/>
-                </a:solidFill>
-              </a:rPr>
-              <a:t>…</a:t>
-            </a:r>
-            <a:endParaRPr lang="nl-BE" dirty="0">
-              <a:solidFill>
-                <a:schemeClr val="tx1"/>
-              </a:solidFill>
-            </a:endParaRPr>
-          </a:p>
-        </p:txBody>
-      </p:sp>
-      <p:sp>
-        <p:nvSpPr>
-          <p:cNvPr id="58" name="Afgeronde rechthoek 57"/>
-          <p:cNvSpPr/>
-          <p:nvPr/>
-        </p:nvSpPr>
-        <p:spPr bwMode="auto">
-          <a:xfrm>
-            <a:off x="5857882" y="4643439"/>
-            <a:ext cx="1428750" cy="1143000"/>
-          </a:xfrm>
-          <a:prstGeom prst="roundRect">
-            <a:avLst/>
-          </a:prstGeom>
-          <a:ln>
-            <a:headEnd type="none" w="med" len="med"/>
-            <a:tailEnd type="none" w="med" len="med"/>
-          </a:ln>
-        </p:spPr>
-        <p:style>
-          <a:lnRef idx="1">
-            <a:schemeClr val="accent2"/>
-          </a:lnRef>
-          <a:fillRef idx="2">
-            <a:schemeClr val="accent2"/>
-          </a:fillRef>
-          <a:effectRef idx="1">
-            <a:schemeClr val="accent2"/>
-          </a:effectRef>
-          <a:fontRef idx="minor">
-            <a:schemeClr val="dk1"/>
-          </a:fontRef>
-        </p:style>
-        <p:txBody>
-          <a:bodyPr/>
-          <a:lstStyle/>
-          <a:p>
-            <a:pPr>
-              <a:defRPr/>
-            </a:pPr>
-            <a:r>
-              <a:rPr lang="nl-BE" dirty="0" err="1" smtClean="0">
-                <a:solidFill>
-                  <a:schemeClr val="tx1"/>
-                </a:solidFill>
-              </a:rPr>
-              <a:t>caching</a:t>
-            </a:r>
-            <a:endParaRPr lang="nl-BE" dirty="0" smtClean="0">
-              <a:solidFill>
-                <a:schemeClr val="tx1"/>
-              </a:solidFill>
-            </a:endParaRPr>
-          </a:p>
-          <a:p>
-            <a:pPr>
-              <a:defRPr/>
-            </a:pPr>
-            <a:r>
-              <a:rPr lang="nl-BE" dirty="0" err="1" smtClean="0">
-                <a:solidFill>
-                  <a:schemeClr val="tx1"/>
-                </a:solidFill>
-              </a:rPr>
-              <a:t>strategy</a:t>
-            </a:r>
-            <a:r>
-              <a:rPr lang="nl-BE" dirty="0" smtClean="0">
-                <a:solidFill>
-                  <a:schemeClr val="tx1"/>
-                </a:solidFill>
-              </a:rPr>
-              <a:t> …</a:t>
             </a:r>
             <a:endParaRPr lang="nl-BE" dirty="0">
               <a:solidFill>

</xml_diff>